<commit_message>
Added Graphs, Tables to presentation
</commit_message>
<xml_diff>
--- a/ex1/Presentations/Microprocessors-ex1.pptx
+++ b/ex1/Presentations/Microprocessors-ex1.pptx
@@ -13,6 +13,7 @@
     <p:sldId id="261" r:id="rId7"/>
     <p:sldId id="262" r:id="rId8"/>
     <p:sldId id="263" r:id="rId9"/>
+    <p:sldId id="264" r:id="rId10"/>
   </p:sldIdLst>
   <p:sldSz cx="12192000" cy="6858000"/>
   <p:notesSz cx="6858000" cy="9144000"/>
@@ -111,6 +112,11 @@
       </a:defRPr>
     </a:lvl9pPr>
   </p:defaultTextStyle>
+  <p:extLst>
+    <p:ext uri="{EFAFB233-063F-42B5-8137-9DF3F51BA10A}">
+      <p15:sldGuideLst xmlns:p15="http://schemas.microsoft.com/office/powerpoint/2012/main"/>
+    </p:ext>
+  </p:extLst>
 </p:presentation>
 </file>
 
@@ -245,7 +251,7 @@
           <a:p>
             <a:fld id="{76170030-3F87-4419-8BD3-4DF954EB0D24}" type="datetimeFigureOut">
               <a:rPr lang="de-DE" smtClean="0"/>
-              <a:t>27.11.2015</a:t>
+              <a:t>29.11.2015</a:t>
             </a:fld>
             <a:endParaRPr lang="de-DE"/>
           </a:p>
@@ -415,7 +421,7 @@
           <a:p>
             <a:fld id="{76170030-3F87-4419-8BD3-4DF954EB0D24}" type="datetimeFigureOut">
               <a:rPr lang="de-DE" smtClean="0"/>
-              <a:t>27.11.2015</a:t>
+              <a:t>29.11.2015</a:t>
             </a:fld>
             <a:endParaRPr lang="de-DE"/>
           </a:p>
@@ -595,7 +601,7 @@
           <a:p>
             <a:fld id="{76170030-3F87-4419-8BD3-4DF954EB0D24}" type="datetimeFigureOut">
               <a:rPr lang="de-DE" smtClean="0"/>
-              <a:t>27.11.2015</a:t>
+              <a:t>29.11.2015</a:t>
             </a:fld>
             <a:endParaRPr lang="de-DE"/>
           </a:p>
@@ -765,7 +771,7 @@
           <a:p>
             <a:fld id="{76170030-3F87-4419-8BD3-4DF954EB0D24}" type="datetimeFigureOut">
               <a:rPr lang="de-DE" smtClean="0"/>
-              <a:t>27.11.2015</a:t>
+              <a:t>29.11.2015</a:t>
             </a:fld>
             <a:endParaRPr lang="de-DE"/>
           </a:p>
@@ -1011,7 +1017,7 @@
           <a:p>
             <a:fld id="{76170030-3F87-4419-8BD3-4DF954EB0D24}" type="datetimeFigureOut">
               <a:rPr lang="de-DE" smtClean="0"/>
-              <a:t>27.11.2015</a:t>
+              <a:t>29.11.2015</a:t>
             </a:fld>
             <a:endParaRPr lang="de-DE"/>
           </a:p>
@@ -1243,7 +1249,7 @@
           <a:p>
             <a:fld id="{76170030-3F87-4419-8BD3-4DF954EB0D24}" type="datetimeFigureOut">
               <a:rPr lang="de-DE" smtClean="0"/>
-              <a:t>27.11.2015</a:t>
+              <a:t>29.11.2015</a:t>
             </a:fld>
             <a:endParaRPr lang="de-DE"/>
           </a:p>
@@ -1610,7 +1616,7 @@
           <a:p>
             <a:fld id="{76170030-3F87-4419-8BD3-4DF954EB0D24}" type="datetimeFigureOut">
               <a:rPr lang="de-DE" smtClean="0"/>
-              <a:t>27.11.2015</a:t>
+              <a:t>29.11.2015</a:t>
             </a:fld>
             <a:endParaRPr lang="de-DE"/>
           </a:p>
@@ -1728,7 +1734,7 @@
           <a:p>
             <a:fld id="{76170030-3F87-4419-8BD3-4DF954EB0D24}" type="datetimeFigureOut">
               <a:rPr lang="de-DE" smtClean="0"/>
-              <a:t>27.11.2015</a:t>
+              <a:t>29.11.2015</a:t>
             </a:fld>
             <a:endParaRPr lang="de-DE"/>
           </a:p>
@@ -1823,7 +1829,7 @@
           <a:p>
             <a:fld id="{76170030-3F87-4419-8BD3-4DF954EB0D24}" type="datetimeFigureOut">
               <a:rPr lang="de-DE" smtClean="0"/>
-              <a:t>27.11.2015</a:t>
+              <a:t>29.11.2015</a:t>
             </a:fld>
             <a:endParaRPr lang="de-DE"/>
           </a:p>
@@ -2100,7 +2106,7 @@
           <a:p>
             <a:fld id="{76170030-3F87-4419-8BD3-4DF954EB0D24}" type="datetimeFigureOut">
               <a:rPr lang="de-DE" smtClean="0"/>
-              <a:t>27.11.2015</a:t>
+              <a:t>29.11.2015</a:t>
             </a:fld>
             <a:endParaRPr lang="de-DE"/>
           </a:p>
@@ -2353,7 +2359,7 @@
           <a:p>
             <a:fld id="{76170030-3F87-4419-8BD3-4DF954EB0D24}" type="datetimeFigureOut">
               <a:rPr lang="de-DE" smtClean="0"/>
-              <a:t>27.11.2015</a:t>
+              <a:t>29.11.2015</a:t>
             </a:fld>
             <a:endParaRPr lang="de-DE"/>
           </a:p>
@@ -2566,7 +2572,7 @@
           <a:p>
             <a:fld id="{76170030-3F87-4419-8BD3-4DF954EB0D24}" type="datetimeFigureOut">
               <a:rPr lang="de-DE" smtClean="0"/>
-              <a:t>27.11.2015</a:t>
+              <a:t>29.11.2015</a:t>
             </a:fld>
             <a:endParaRPr lang="de-DE"/>
           </a:p>
@@ -3829,22 +3835,1237 @@
             <a:spLocks noGrp="1"/>
           </p:cNvSpPr>
           <p:nvPr>
-            <p:ph idx="1"/>
-          </p:nvPr>
-        </p:nvSpPr>
-        <p:spPr/>
-        <p:txBody>
-          <a:bodyPr/>
-          <a:lstStyle/>
-          <a:p>
-            <a:endParaRPr lang="de-DE"/>
-          </a:p>
-        </p:txBody>
-      </p:sp>
+            <p:ph sz="half" idx="1"/>
+          </p:nvPr>
+        </p:nvSpPr>
+        <p:spPr/>
+        <p:txBody>
+          <a:bodyPr/>
+          <a:lstStyle/>
+          <a:p>
+            <a:r>
+              <a:rPr lang="de-DE" dirty="0" err="1" smtClean="0"/>
+              <a:t>No</a:t>
+            </a:r>
+            <a:r>
+              <a:rPr lang="de-DE" dirty="0" smtClean="0"/>
+              <a:t> </a:t>
+            </a:r>
+            <a:r>
+              <a:rPr lang="de-DE" dirty="0" err="1" smtClean="0"/>
+              <a:t>Optimisation</a:t>
+            </a:r>
+            <a:r>
+              <a:rPr lang="de-DE" dirty="0" smtClean="0"/>
+              <a:t> (-O0)</a:t>
+            </a:r>
+            <a:endParaRPr lang="de-DE" dirty="0"/>
+          </a:p>
+        </p:txBody>
+      </p:sp>
+      <p:sp>
+        <p:nvSpPr>
+          <p:cNvPr id="5" name="Inhaltsplatzhalter 4"/>
+          <p:cNvSpPr>
+            <a:spLocks noGrp="1"/>
+          </p:cNvSpPr>
+          <p:nvPr>
+            <p:ph sz="half" idx="2"/>
+          </p:nvPr>
+        </p:nvSpPr>
+        <p:spPr/>
+        <p:txBody>
+          <a:bodyPr/>
+          <a:lstStyle/>
+          <a:p>
+            <a:pPr marL="0" indent="0">
+              <a:buNone/>
+            </a:pPr>
+            <a:r>
+              <a:rPr lang="de-DE" dirty="0" smtClean="0"/>
+              <a:t>-O3</a:t>
+            </a:r>
+            <a:endParaRPr lang="de-DE" dirty="0"/>
+          </a:p>
+        </p:txBody>
+      </p:sp>
+      <p:pic>
+        <p:nvPicPr>
+          <p:cNvPr id="6" name="Grafik 5"/>
+          <p:cNvPicPr>
+            <a:picLocks noChangeAspect="1"/>
+          </p:cNvPicPr>
+          <p:nvPr/>
+        </p:nvPicPr>
+        <p:blipFill>
+          <a:blip r:embed="rId2">
+            <a:extLst>
+              <a:ext uri="{28A0092B-C50C-407E-A947-70E740481C1C}">
+                <a14:useLocalDpi xmlns:a14="http://schemas.microsoft.com/office/drawing/2010/main" val="0"/>
+              </a:ext>
+            </a:extLst>
+          </a:blip>
+          <a:stretch>
+            <a:fillRect/>
+          </a:stretch>
+        </p:blipFill>
+        <p:spPr>
+          <a:xfrm>
+            <a:off x="171697" y="2226361"/>
+            <a:ext cx="5771903" cy="4328928"/>
+          </a:xfrm>
+          <a:prstGeom prst="rect">
+            <a:avLst/>
+          </a:prstGeom>
+        </p:spPr>
+      </p:pic>
+      <p:pic>
+        <p:nvPicPr>
+          <p:cNvPr id="7" name="Grafik 6"/>
+          <p:cNvPicPr>
+            <a:picLocks noChangeAspect="1"/>
+          </p:cNvPicPr>
+          <p:nvPr/>
+        </p:nvPicPr>
+        <p:blipFill>
+          <a:blip r:embed="rId3">
+            <a:extLst>
+              <a:ext uri="{28A0092B-C50C-407E-A947-70E740481C1C}">
+                <a14:useLocalDpi xmlns:a14="http://schemas.microsoft.com/office/drawing/2010/main" val="0"/>
+              </a:ext>
+            </a:extLst>
+          </a:blip>
+          <a:stretch>
+            <a:fillRect/>
+          </a:stretch>
+        </p:blipFill>
+        <p:spPr>
+          <a:xfrm>
+            <a:off x="6019800" y="2220670"/>
+            <a:ext cx="5787081" cy="4340311"/>
+          </a:xfrm>
+          <a:prstGeom prst="rect">
+            <a:avLst/>
+          </a:prstGeom>
+        </p:spPr>
+      </p:pic>
     </p:spTree>
     <p:extLst>
       <p:ext uri="{BB962C8B-B14F-4D97-AF65-F5344CB8AC3E}">
         <p14:creationId xmlns:p14="http://schemas.microsoft.com/office/powerpoint/2010/main" val="2349849561"/>
+      </p:ext>
+    </p:extLst>
+  </p:cSld>
+  <p:clrMapOvr>
+    <a:masterClrMapping/>
+  </p:clrMapOvr>
+</p:sld>
+</file>
+
+<file path=ppt/slides/slide9.xml><?xml version="1.0" encoding="utf-8"?>
+<p:sld xmlns:a="http://schemas.openxmlformats.org/drawingml/2006/main" xmlns:r="http://schemas.openxmlformats.org/officeDocument/2006/relationships" xmlns:p="http://schemas.openxmlformats.org/presentationml/2006/main">
+  <p:cSld>
+    <p:spTree>
+      <p:nvGrpSpPr>
+        <p:cNvPr id="1" name=""/>
+        <p:cNvGrpSpPr/>
+        <p:nvPr/>
+      </p:nvGrpSpPr>
+      <p:grpSpPr>
+        <a:xfrm>
+          <a:off x="0" y="0"/>
+          <a:ext cx="0" cy="0"/>
+          <a:chOff x="0" y="0"/>
+          <a:chExt cx="0" cy="0"/>
+        </a:xfrm>
+      </p:grpSpPr>
+      <p:sp>
+        <p:nvSpPr>
+          <p:cNvPr id="2" name="Titel 1"/>
+          <p:cNvSpPr>
+            <a:spLocks noGrp="1"/>
+          </p:cNvSpPr>
+          <p:nvPr>
+            <p:ph type="title"/>
+          </p:nvPr>
+        </p:nvSpPr>
+        <p:spPr/>
+        <p:txBody>
+          <a:bodyPr/>
+          <a:lstStyle/>
+          <a:p>
+            <a:r>
+              <a:rPr lang="de-DE" dirty="0" err="1" smtClean="0"/>
+              <a:t>Speedup</a:t>
+            </a:r>
+            <a:r>
+              <a:rPr lang="de-DE" dirty="0" smtClean="0"/>
+              <a:t> </a:t>
+            </a:r>
+            <a:r>
+              <a:rPr lang="de-DE" dirty="0" err="1" smtClean="0"/>
+              <a:t>Comparison</a:t>
+            </a:r>
+            <a:endParaRPr lang="de-DE" dirty="0"/>
+          </a:p>
+        </p:txBody>
+      </p:sp>
+      <p:graphicFrame>
+        <p:nvGraphicFramePr>
+          <p:cNvPr id="5" name="Inhaltsplatzhalter 4"/>
+          <p:cNvGraphicFramePr>
+            <a:graphicFrameLocks noGrp="1"/>
+          </p:cNvGraphicFramePr>
+          <p:nvPr>
+            <p:ph sz="half" idx="1"/>
+            <p:extLst>
+              <p:ext uri="{D42A27DB-BD31-4B8C-83A1-F6EECF244321}">
+                <p14:modId xmlns:p14="http://schemas.microsoft.com/office/powerpoint/2010/main" val="3479290816"/>
+              </p:ext>
+            </p:extLst>
+          </p:nvPr>
+        </p:nvGraphicFramePr>
+        <p:xfrm>
+          <a:off x="617836" y="1825625"/>
+          <a:ext cx="5401964" cy="3235960"/>
+        </p:xfrm>
+        <a:graphic>
+          <a:graphicData uri="http://schemas.openxmlformats.org/drawingml/2006/table">
+            <a:tbl>
+              <a:tblPr firstRow="1" bandRow="1">
+                <a:tableStyleId>{5C22544A-7EE6-4342-B048-85BDC9FD1C3A}</a:tableStyleId>
+              </a:tblPr>
+              <a:tblGrid>
+                <a:gridCol w="1350491"/>
+                <a:gridCol w="1350491"/>
+                <a:gridCol w="1350491"/>
+                <a:gridCol w="1350491"/>
+              </a:tblGrid>
+              <a:tr h="370840">
+                <a:tc>
+                  <a:txBody>
+                    <a:bodyPr/>
+                    <a:lstStyle/>
+                    <a:p>
+                      <a:r>
+                        <a:rPr lang="de-DE" dirty="0" smtClean="0"/>
+                        <a:t>-o0</a:t>
+                      </a:r>
+                      <a:endParaRPr lang="de-DE" dirty="0"/>
+                    </a:p>
+                  </a:txBody>
+                  <a:tcPr/>
+                </a:tc>
+                <a:tc>
+                  <a:txBody>
+                    <a:bodyPr/>
+                    <a:lstStyle/>
+                    <a:p>
+                      <a:r>
+                        <a:rPr lang="de-DE" dirty="0" smtClean="0"/>
+                        <a:t>2 </a:t>
+                      </a:r>
+                      <a:r>
+                        <a:rPr lang="de-DE" dirty="0" err="1" smtClean="0"/>
+                        <a:t>mio</a:t>
+                      </a:r>
+                      <a:endParaRPr lang="de-DE" dirty="0"/>
+                    </a:p>
+                  </a:txBody>
+                  <a:tcPr/>
+                </a:tc>
+                <a:tc>
+                  <a:txBody>
+                    <a:bodyPr/>
+                    <a:lstStyle/>
+                    <a:p>
+                      <a:r>
+                        <a:rPr lang="de-DE" dirty="0" smtClean="0"/>
+                        <a:t>10</a:t>
+                      </a:r>
+                      <a:r>
+                        <a:rPr lang="de-DE" baseline="0" dirty="0" smtClean="0"/>
+                        <a:t> </a:t>
+                      </a:r>
+                      <a:r>
+                        <a:rPr lang="de-DE" baseline="0" dirty="0" err="1" smtClean="0"/>
+                        <a:t>mio</a:t>
+                      </a:r>
+                      <a:endParaRPr lang="de-DE" dirty="0"/>
+                    </a:p>
+                  </a:txBody>
+                  <a:tcPr/>
+                </a:tc>
+                <a:tc>
+                  <a:txBody>
+                    <a:bodyPr/>
+                    <a:lstStyle/>
+                    <a:p>
+                      <a:r>
+                        <a:rPr lang="de-DE" dirty="0" smtClean="0"/>
+                        <a:t>20 </a:t>
+                      </a:r>
+                      <a:r>
+                        <a:rPr lang="de-DE" dirty="0" err="1" smtClean="0"/>
+                        <a:t>mio</a:t>
+                      </a:r>
+                      <a:endParaRPr lang="de-DE" dirty="0"/>
+                    </a:p>
+                  </a:txBody>
+                  <a:tcPr/>
+                </a:tc>
+              </a:tr>
+              <a:tr h="370840">
+                <a:tc>
+                  <a:txBody>
+                    <a:bodyPr/>
+                    <a:lstStyle/>
+                    <a:p>
+                      <a:r>
+                        <a:rPr lang="de-DE" dirty="0" smtClean="0"/>
+                        <a:t>simple</a:t>
+                      </a:r>
+                      <a:endParaRPr lang="de-DE" dirty="0"/>
+                    </a:p>
+                  </a:txBody>
+                  <a:tcPr/>
+                </a:tc>
+                <a:tc>
+                  <a:txBody>
+                    <a:bodyPr/>
+                    <a:lstStyle/>
+                    <a:p>
+                      <a:r>
+                        <a:rPr lang="de-DE" dirty="0" smtClean="0"/>
+                        <a:t>0.012293</a:t>
+                      </a:r>
+                      <a:endParaRPr lang="de-DE" dirty="0"/>
+                    </a:p>
+                  </a:txBody>
+                  <a:tcPr/>
+                </a:tc>
+                <a:tc>
+                  <a:txBody>
+                    <a:bodyPr/>
+                    <a:lstStyle/>
+                    <a:p>
+                      <a:r>
+                        <a:rPr lang="de-DE" dirty="0" smtClean="0"/>
+                        <a:t>0.061624</a:t>
+                      </a:r>
+                      <a:endParaRPr lang="de-DE" dirty="0"/>
+                    </a:p>
+                  </a:txBody>
+                  <a:tcPr/>
+                </a:tc>
+                <a:tc>
+                  <a:txBody>
+                    <a:bodyPr/>
+                    <a:lstStyle/>
+                    <a:p>
+                      <a:r>
+                        <a:rPr lang="de-DE" dirty="0" smtClean="0"/>
+                        <a:t>0.123405</a:t>
+                      </a:r>
+                      <a:endParaRPr lang="de-DE" dirty="0"/>
+                    </a:p>
+                  </a:txBody>
+                  <a:tcPr/>
+                </a:tc>
+              </a:tr>
+              <a:tr h="370840">
+                <a:tc>
+                  <a:txBody>
+                    <a:bodyPr/>
+                    <a:lstStyle/>
+                    <a:p>
+                      <a:r>
+                        <a:rPr lang="de-DE" dirty="0" err="1" smtClean="0"/>
+                        <a:t>asm</a:t>
+                      </a:r>
+                      <a:endParaRPr lang="de-DE" dirty="0"/>
+                    </a:p>
+                  </a:txBody>
+                  <a:tcPr/>
+                </a:tc>
+                <a:tc>
+                  <a:txBody>
+                    <a:bodyPr/>
+                    <a:lstStyle/>
+                    <a:p>
+                      <a:r>
+                        <a:rPr lang="de-DE" dirty="0" smtClean="0"/>
+                        <a:t>0.007894</a:t>
+                      </a:r>
+                      <a:endParaRPr lang="de-DE" dirty="0"/>
+                    </a:p>
+                  </a:txBody>
+                  <a:tcPr/>
+                </a:tc>
+                <a:tc>
+                  <a:txBody>
+                    <a:bodyPr/>
+                    <a:lstStyle/>
+                    <a:p>
+                      <a:r>
+                        <a:rPr lang="de-DE" dirty="0" smtClean="0"/>
+                        <a:t>0.039501</a:t>
+                      </a:r>
+                      <a:endParaRPr lang="de-DE" dirty="0"/>
+                    </a:p>
+                  </a:txBody>
+                  <a:tcPr/>
+                </a:tc>
+                <a:tc>
+                  <a:txBody>
+                    <a:bodyPr/>
+                    <a:lstStyle/>
+                    <a:p>
+                      <a:r>
+                        <a:rPr lang="de-DE" dirty="0" smtClean="0"/>
+                        <a:t>0.079033</a:t>
+                      </a:r>
+                      <a:endParaRPr lang="de-DE" dirty="0"/>
+                    </a:p>
+                  </a:txBody>
+                  <a:tcPr/>
+                </a:tc>
+              </a:tr>
+              <a:tr h="370840">
+                <a:tc>
+                  <a:txBody>
+                    <a:bodyPr/>
+                    <a:lstStyle/>
+                    <a:p>
+                      <a:r>
+                        <a:rPr lang="de-DE" dirty="0" err="1" smtClean="0"/>
+                        <a:t>lookupConst</a:t>
+                      </a:r>
+                      <a:endParaRPr lang="de-DE" dirty="0"/>
+                    </a:p>
+                  </a:txBody>
+                  <a:tcPr/>
+                </a:tc>
+                <a:tc>
+                  <a:txBody>
+                    <a:bodyPr/>
+                    <a:lstStyle/>
+                    <a:p>
+                      <a:r>
+                        <a:rPr lang="de-DE" dirty="0" smtClean="0"/>
+                        <a:t>0.004766</a:t>
+                      </a:r>
+                      <a:endParaRPr lang="de-DE" dirty="0"/>
+                    </a:p>
+                  </a:txBody>
+                  <a:tcPr/>
+                </a:tc>
+                <a:tc>
+                  <a:txBody>
+                    <a:bodyPr/>
+                    <a:lstStyle/>
+                    <a:p>
+                      <a:r>
+                        <a:rPr lang="de-DE" dirty="0" smtClean="0"/>
+                        <a:t>0.023870</a:t>
+                      </a:r>
+                      <a:endParaRPr lang="de-DE" dirty="0"/>
+                    </a:p>
+                  </a:txBody>
+                  <a:tcPr/>
+                </a:tc>
+                <a:tc>
+                  <a:txBody>
+                    <a:bodyPr/>
+                    <a:lstStyle/>
+                    <a:p>
+                      <a:r>
+                        <a:rPr lang="de-DE" dirty="0" smtClean="0"/>
+                        <a:t>0.047762</a:t>
+                      </a:r>
+                      <a:endParaRPr lang="de-DE" dirty="0"/>
+                    </a:p>
+                  </a:txBody>
+                  <a:tcPr/>
+                </a:tc>
+              </a:tr>
+              <a:tr h="370840">
+                <a:tc>
+                  <a:txBody>
+                    <a:bodyPr/>
+                    <a:lstStyle/>
+                    <a:p>
+                      <a:r>
+                        <a:rPr lang="de-DE" dirty="0" smtClean="0"/>
+                        <a:t>mmx</a:t>
+                      </a:r>
+                      <a:endParaRPr lang="de-DE" dirty="0"/>
+                    </a:p>
+                  </a:txBody>
+                  <a:tcPr/>
+                </a:tc>
+                <a:tc>
+                  <a:txBody>
+                    <a:bodyPr/>
+                    <a:lstStyle/>
+                    <a:p>
+                      <a:r>
+                        <a:rPr lang="de-DE" dirty="0" smtClean="0"/>
+                        <a:t>0.003004</a:t>
+                      </a:r>
+                      <a:endParaRPr lang="de-DE" dirty="0"/>
+                    </a:p>
+                  </a:txBody>
+                  <a:tcPr/>
+                </a:tc>
+                <a:tc>
+                  <a:txBody>
+                    <a:bodyPr/>
+                    <a:lstStyle/>
+                    <a:p>
+                      <a:r>
+                        <a:rPr lang="de-DE" dirty="0" smtClean="0"/>
+                        <a:t>0.015570</a:t>
+                      </a:r>
+                      <a:endParaRPr lang="de-DE" dirty="0"/>
+                    </a:p>
+                  </a:txBody>
+                  <a:tcPr/>
+                </a:tc>
+                <a:tc>
+                  <a:txBody>
+                    <a:bodyPr/>
+                    <a:lstStyle/>
+                    <a:p>
+                      <a:r>
+                        <a:rPr lang="de-DE" dirty="0" smtClean="0"/>
+                        <a:t>0.031069</a:t>
+                      </a:r>
+                      <a:endParaRPr lang="de-DE" dirty="0"/>
+                    </a:p>
+                  </a:txBody>
+                  <a:tcPr/>
+                </a:tc>
+              </a:tr>
+              <a:tr h="370840">
+                <a:tc>
+                  <a:txBody>
+                    <a:bodyPr/>
+                    <a:lstStyle/>
+                    <a:p>
+                      <a:r>
+                        <a:rPr lang="de-DE" dirty="0" err="1" smtClean="0"/>
+                        <a:t>sse</a:t>
+                      </a:r>
+                      <a:endParaRPr lang="de-DE" dirty="0"/>
+                    </a:p>
+                  </a:txBody>
+                  <a:tcPr/>
+                </a:tc>
+                <a:tc>
+                  <a:txBody>
+                    <a:bodyPr/>
+                    <a:lstStyle/>
+                    <a:p>
+                      <a:r>
+                        <a:rPr lang="de-DE" dirty="0" smtClean="0"/>
+                        <a:t>0.001071</a:t>
+                      </a:r>
+                      <a:endParaRPr lang="de-DE" dirty="0"/>
+                    </a:p>
+                  </a:txBody>
+                  <a:tcPr/>
+                </a:tc>
+                <a:tc>
+                  <a:txBody>
+                    <a:bodyPr/>
+                    <a:lstStyle/>
+                    <a:p>
+                      <a:r>
+                        <a:rPr lang="de-DE" dirty="0" smtClean="0"/>
+                        <a:t>0.005786</a:t>
+                      </a:r>
+                      <a:endParaRPr lang="de-DE" dirty="0"/>
+                    </a:p>
+                  </a:txBody>
+                  <a:tcPr/>
+                </a:tc>
+                <a:tc>
+                  <a:txBody>
+                    <a:bodyPr/>
+                    <a:lstStyle/>
+                    <a:p>
+                      <a:r>
+                        <a:rPr lang="de-DE" dirty="0" smtClean="0"/>
+                        <a:t>0.011582</a:t>
+                      </a:r>
+                      <a:endParaRPr lang="de-DE" dirty="0"/>
+                    </a:p>
+                  </a:txBody>
+                  <a:tcPr/>
+                </a:tc>
+              </a:tr>
+              <a:tr h="370840">
+                <a:tc>
+                  <a:txBody>
+                    <a:bodyPr/>
+                    <a:lstStyle/>
+                    <a:p>
+                      <a:r>
+                        <a:rPr lang="de-DE" dirty="0" err="1" smtClean="0"/>
+                        <a:t>avx</a:t>
+                      </a:r>
+                      <a:endParaRPr lang="de-DE" dirty="0"/>
+                    </a:p>
+                  </a:txBody>
+                  <a:tcPr/>
+                </a:tc>
+                <a:tc>
+                  <a:txBody>
+                    <a:bodyPr/>
+                    <a:lstStyle/>
+                    <a:p>
+                      <a:r>
+                        <a:rPr lang="de-DE" b="1" dirty="0" smtClean="0"/>
+                        <a:t>0.000598</a:t>
+                      </a:r>
+                      <a:endParaRPr lang="de-DE" b="1" dirty="0"/>
+                    </a:p>
+                  </a:txBody>
+                  <a:tcPr/>
+                </a:tc>
+                <a:tc>
+                  <a:txBody>
+                    <a:bodyPr/>
+                    <a:lstStyle/>
+                    <a:p>
+                      <a:r>
+                        <a:rPr lang="de-DE" b="1" dirty="0" smtClean="0"/>
+                        <a:t>0.003400</a:t>
+                      </a:r>
+                      <a:endParaRPr lang="de-DE" b="1" dirty="0"/>
+                    </a:p>
+                  </a:txBody>
+                  <a:tcPr/>
+                </a:tc>
+                <a:tc>
+                  <a:txBody>
+                    <a:bodyPr/>
+                    <a:lstStyle/>
+                    <a:p>
+                      <a:r>
+                        <a:rPr lang="de-DE" b="1" dirty="0" smtClean="0"/>
+                        <a:t>0.006728</a:t>
+                      </a:r>
+                      <a:endParaRPr lang="de-DE" b="1" dirty="0"/>
+                    </a:p>
+                  </a:txBody>
+                  <a:tcPr/>
+                </a:tc>
+              </a:tr>
+              <a:tr h="370840">
+                <a:tc>
+                  <a:txBody>
+                    <a:bodyPr/>
+                    <a:lstStyle/>
+                    <a:p>
+                      <a:r>
+                        <a:rPr lang="de-DE" dirty="0" err="1" smtClean="0"/>
+                        <a:t>speedup</a:t>
+                      </a:r>
+                      <a:endParaRPr lang="de-DE" dirty="0" smtClean="0"/>
+                    </a:p>
+                    <a:p>
+                      <a:r>
+                        <a:rPr lang="de-DE" dirty="0" smtClean="0"/>
+                        <a:t>(simple/</a:t>
+                      </a:r>
+                      <a:r>
+                        <a:rPr lang="de-DE" dirty="0" err="1" smtClean="0"/>
+                        <a:t>avx</a:t>
+                      </a:r>
+                      <a:r>
+                        <a:rPr lang="de-DE" dirty="0" smtClean="0"/>
+                        <a:t>)</a:t>
+                      </a:r>
+                      <a:endParaRPr lang="de-DE" dirty="0"/>
+                    </a:p>
+                  </a:txBody>
+                  <a:tcPr/>
+                </a:tc>
+                <a:tc>
+                  <a:txBody>
+                    <a:bodyPr/>
+                    <a:lstStyle/>
+                    <a:p>
+                      <a:r>
+                        <a:rPr lang="de-DE" dirty="0" smtClean="0"/>
+                        <a:t>~ 20x</a:t>
+                      </a:r>
+                      <a:endParaRPr lang="de-DE" dirty="0"/>
+                    </a:p>
+                  </a:txBody>
+                  <a:tcPr/>
+                </a:tc>
+                <a:tc>
+                  <a:txBody>
+                    <a:bodyPr/>
+                    <a:lstStyle/>
+                    <a:p>
+                      <a:r>
+                        <a:rPr lang="de-DE" dirty="0" smtClean="0"/>
+                        <a:t>~ 18x</a:t>
+                      </a:r>
+                      <a:endParaRPr lang="de-DE" dirty="0"/>
+                    </a:p>
+                  </a:txBody>
+                  <a:tcPr/>
+                </a:tc>
+                <a:tc>
+                  <a:txBody>
+                    <a:bodyPr/>
+                    <a:lstStyle/>
+                    <a:p>
+                      <a:r>
+                        <a:rPr lang="de-DE" dirty="0" smtClean="0"/>
+                        <a:t>~ 18x</a:t>
+                      </a:r>
+                      <a:endParaRPr lang="de-DE" dirty="0"/>
+                    </a:p>
+                  </a:txBody>
+                  <a:tcPr/>
+                </a:tc>
+              </a:tr>
+            </a:tbl>
+          </a:graphicData>
+        </a:graphic>
+      </p:graphicFrame>
+      <p:graphicFrame>
+        <p:nvGraphicFramePr>
+          <p:cNvPr id="6" name="Inhaltsplatzhalter 5"/>
+          <p:cNvGraphicFramePr>
+            <a:graphicFrameLocks noGrp="1"/>
+          </p:cNvGraphicFramePr>
+          <p:nvPr>
+            <p:ph sz="half" idx="2"/>
+            <p:extLst>
+              <p:ext uri="{D42A27DB-BD31-4B8C-83A1-F6EECF244321}">
+                <p14:modId xmlns:p14="http://schemas.microsoft.com/office/powerpoint/2010/main" val="3264087866"/>
+              </p:ext>
+            </p:extLst>
+          </p:nvPr>
+        </p:nvGraphicFramePr>
+        <p:xfrm>
+          <a:off x="6172200" y="1825625"/>
+          <a:ext cx="5492576" cy="3235960"/>
+        </p:xfrm>
+        <a:graphic>
+          <a:graphicData uri="http://schemas.openxmlformats.org/drawingml/2006/table">
+            <a:tbl>
+              <a:tblPr firstRow="1" bandRow="1">
+                <a:tableStyleId>{5C22544A-7EE6-4342-B048-85BDC9FD1C3A}</a:tableStyleId>
+              </a:tblPr>
+              <a:tblGrid>
+                <a:gridCol w="1373144"/>
+                <a:gridCol w="1373144"/>
+                <a:gridCol w="1373144"/>
+                <a:gridCol w="1373144"/>
+              </a:tblGrid>
+              <a:tr h="370840">
+                <a:tc>
+                  <a:txBody>
+                    <a:bodyPr/>
+                    <a:lstStyle/>
+                    <a:p>
+                      <a:r>
+                        <a:rPr lang="de-DE" dirty="0" smtClean="0"/>
+                        <a:t>-o3</a:t>
+                      </a:r>
+                      <a:endParaRPr lang="de-DE" dirty="0"/>
+                    </a:p>
+                  </a:txBody>
+                  <a:tcPr/>
+                </a:tc>
+                <a:tc>
+                  <a:txBody>
+                    <a:bodyPr/>
+                    <a:lstStyle/>
+                    <a:p>
+                      <a:r>
+                        <a:rPr lang="de-DE" dirty="0" smtClean="0"/>
+                        <a:t>2mio</a:t>
+                      </a:r>
+                      <a:endParaRPr lang="de-DE" dirty="0"/>
+                    </a:p>
+                  </a:txBody>
+                  <a:tcPr/>
+                </a:tc>
+                <a:tc>
+                  <a:txBody>
+                    <a:bodyPr/>
+                    <a:lstStyle/>
+                    <a:p>
+                      <a:r>
+                        <a:rPr lang="de-DE" dirty="0" smtClean="0"/>
+                        <a:t>10mio</a:t>
+                      </a:r>
+                      <a:endParaRPr lang="de-DE" dirty="0"/>
+                    </a:p>
+                  </a:txBody>
+                  <a:tcPr/>
+                </a:tc>
+                <a:tc>
+                  <a:txBody>
+                    <a:bodyPr/>
+                    <a:lstStyle/>
+                    <a:p>
+                      <a:r>
+                        <a:rPr lang="de-DE" dirty="0" smtClean="0"/>
+                        <a:t>20mio</a:t>
+                      </a:r>
+                      <a:endParaRPr lang="de-DE" dirty="0"/>
+                    </a:p>
+                  </a:txBody>
+                  <a:tcPr/>
+                </a:tc>
+              </a:tr>
+              <a:tr h="370840">
+                <a:tc>
+                  <a:txBody>
+                    <a:bodyPr/>
+                    <a:lstStyle/>
+                    <a:p>
+                      <a:r>
+                        <a:rPr lang="de-DE" dirty="0" smtClean="0"/>
+                        <a:t>simple</a:t>
+                      </a:r>
+                      <a:endParaRPr lang="de-DE" dirty="0"/>
+                    </a:p>
+                  </a:txBody>
+                  <a:tcPr/>
+                </a:tc>
+                <a:tc>
+                  <a:txBody>
+                    <a:bodyPr/>
+                    <a:lstStyle/>
+                    <a:p>
+                      <a:r>
+                        <a:rPr lang="de-DE" dirty="0" smtClean="0"/>
+                        <a:t>0.007703</a:t>
+                      </a:r>
+                      <a:endParaRPr lang="de-DE" dirty="0"/>
+                    </a:p>
+                  </a:txBody>
+                  <a:tcPr/>
+                </a:tc>
+                <a:tc>
+                  <a:txBody>
+                    <a:bodyPr/>
+                    <a:lstStyle/>
+                    <a:p>
+                      <a:r>
+                        <a:rPr lang="de-DE" dirty="0" smtClean="0"/>
+                        <a:t>0.038173</a:t>
+                      </a:r>
+                      <a:endParaRPr lang="de-DE" dirty="0"/>
+                    </a:p>
+                  </a:txBody>
+                  <a:tcPr/>
+                </a:tc>
+                <a:tc>
+                  <a:txBody>
+                    <a:bodyPr/>
+                    <a:lstStyle/>
+                    <a:p>
+                      <a:r>
+                        <a:rPr lang="de-DE" dirty="0" smtClean="0"/>
+                        <a:t>0.076197</a:t>
+                      </a:r>
+                      <a:endParaRPr lang="de-DE" dirty="0"/>
+                    </a:p>
+                  </a:txBody>
+                  <a:tcPr/>
+                </a:tc>
+              </a:tr>
+              <a:tr h="370840">
+                <a:tc>
+                  <a:txBody>
+                    <a:bodyPr/>
+                    <a:lstStyle/>
+                    <a:p>
+                      <a:r>
+                        <a:rPr lang="de-DE" dirty="0" err="1" smtClean="0"/>
+                        <a:t>asm</a:t>
+                      </a:r>
+                      <a:endParaRPr lang="de-DE" dirty="0"/>
+                    </a:p>
+                  </a:txBody>
+                  <a:tcPr/>
+                </a:tc>
+                <a:tc>
+                  <a:txBody>
+                    <a:bodyPr/>
+                    <a:lstStyle/>
+                    <a:p>
+                      <a:r>
+                        <a:rPr lang="de-DE" dirty="0" smtClean="0"/>
+                        <a:t>0.008024</a:t>
+                      </a:r>
+                      <a:endParaRPr lang="de-DE" dirty="0"/>
+                    </a:p>
+                  </a:txBody>
+                  <a:tcPr/>
+                </a:tc>
+                <a:tc>
+                  <a:txBody>
+                    <a:bodyPr/>
+                    <a:lstStyle/>
+                    <a:p>
+                      <a:r>
+                        <a:rPr lang="de-DE" dirty="0" smtClean="0"/>
+                        <a:t>0.040065</a:t>
+                      </a:r>
+                      <a:endParaRPr lang="de-DE" dirty="0"/>
+                    </a:p>
+                  </a:txBody>
+                  <a:tcPr/>
+                </a:tc>
+                <a:tc>
+                  <a:txBody>
+                    <a:bodyPr/>
+                    <a:lstStyle/>
+                    <a:p>
+                      <a:r>
+                        <a:rPr lang="de-DE" dirty="0" smtClean="0"/>
+                        <a:t>0.080496</a:t>
+                      </a:r>
+                      <a:endParaRPr lang="de-DE" dirty="0"/>
+                    </a:p>
+                  </a:txBody>
+                  <a:tcPr/>
+                </a:tc>
+              </a:tr>
+              <a:tr h="370840">
+                <a:tc>
+                  <a:txBody>
+                    <a:bodyPr/>
+                    <a:lstStyle/>
+                    <a:p>
+                      <a:r>
+                        <a:rPr lang="de-DE" dirty="0" err="1" smtClean="0"/>
+                        <a:t>lookupConst</a:t>
+                      </a:r>
+                      <a:endParaRPr lang="de-DE" dirty="0"/>
+                    </a:p>
+                  </a:txBody>
+                  <a:tcPr/>
+                </a:tc>
+                <a:tc>
+                  <a:txBody>
+                    <a:bodyPr/>
+                    <a:lstStyle/>
+                    <a:p>
+                      <a:r>
+                        <a:rPr lang="de-DE" dirty="0" smtClean="0"/>
+                        <a:t>0.001360</a:t>
+                      </a:r>
+                      <a:endParaRPr lang="de-DE" dirty="0"/>
+                    </a:p>
+                  </a:txBody>
+                  <a:tcPr/>
+                </a:tc>
+                <a:tc>
+                  <a:txBody>
+                    <a:bodyPr/>
+                    <a:lstStyle/>
+                    <a:p>
+                      <a:r>
+                        <a:rPr lang="de-DE" dirty="0" smtClean="0"/>
+                        <a:t>0.006793</a:t>
+                      </a:r>
+                      <a:endParaRPr lang="de-DE" dirty="0"/>
+                    </a:p>
+                  </a:txBody>
+                  <a:tcPr/>
+                </a:tc>
+                <a:tc>
+                  <a:txBody>
+                    <a:bodyPr/>
+                    <a:lstStyle/>
+                    <a:p>
+                      <a:r>
+                        <a:rPr lang="de-DE" dirty="0" smtClean="0"/>
+                        <a:t>0.013692</a:t>
+                      </a:r>
+                      <a:endParaRPr lang="de-DE" dirty="0"/>
+                    </a:p>
+                  </a:txBody>
+                  <a:tcPr/>
+                </a:tc>
+              </a:tr>
+              <a:tr h="370840">
+                <a:tc>
+                  <a:txBody>
+                    <a:bodyPr/>
+                    <a:lstStyle/>
+                    <a:p>
+                      <a:r>
+                        <a:rPr lang="de-DE" dirty="0" smtClean="0"/>
+                        <a:t>mmx</a:t>
+                      </a:r>
+                      <a:endParaRPr lang="de-DE" dirty="0"/>
+                    </a:p>
+                  </a:txBody>
+                  <a:tcPr/>
+                </a:tc>
+                <a:tc>
+                  <a:txBody>
+                    <a:bodyPr/>
+                    <a:lstStyle/>
+                    <a:p>
+                      <a:r>
+                        <a:rPr lang="de-DE" dirty="0" smtClean="0"/>
+                        <a:t>0.000380</a:t>
+                      </a:r>
+                      <a:endParaRPr lang="de-DE" dirty="0"/>
+                    </a:p>
+                  </a:txBody>
+                  <a:tcPr/>
+                </a:tc>
+                <a:tc>
+                  <a:txBody>
+                    <a:bodyPr/>
+                    <a:lstStyle/>
+                    <a:p>
+                      <a:r>
+                        <a:rPr lang="de-DE" dirty="0" smtClean="0"/>
+                        <a:t>0.001887</a:t>
+                      </a:r>
+                      <a:endParaRPr lang="de-DE" dirty="0"/>
+                    </a:p>
+                  </a:txBody>
+                  <a:tcPr/>
+                </a:tc>
+                <a:tc>
+                  <a:txBody>
+                    <a:bodyPr/>
+                    <a:lstStyle/>
+                    <a:p>
+                      <a:r>
+                        <a:rPr lang="de-DE" dirty="0" smtClean="0"/>
+                        <a:t>0.003872</a:t>
+                      </a:r>
+                      <a:endParaRPr lang="de-DE" dirty="0"/>
+                    </a:p>
+                  </a:txBody>
+                  <a:tcPr/>
+                </a:tc>
+              </a:tr>
+              <a:tr h="370840">
+                <a:tc>
+                  <a:txBody>
+                    <a:bodyPr/>
+                    <a:lstStyle/>
+                    <a:p>
+                      <a:r>
+                        <a:rPr lang="de-DE" dirty="0" err="1" smtClean="0"/>
+                        <a:t>sse</a:t>
+                      </a:r>
+                      <a:endParaRPr lang="de-DE" dirty="0"/>
+                    </a:p>
+                  </a:txBody>
+                  <a:tcPr/>
+                </a:tc>
+                <a:tc>
+                  <a:txBody>
+                    <a:bodyPr/>
+                    <a:lstStyle/>
+                    <a:p>
+                      <a:r>
+                        <a:rPr lang="de-DE" dirty="0" smtClean="0"/>
+                        <a:t>0.000292</a:t>
+                      </a:r>
+                      <a:endParaRPr lang="de-DE" dirty="0"/>
+                    </a:p>
+                  </a:txBody>
+                  <a:tcPr/>
+                </a:tc>
+                <a:tc>
+                  <a:txBody>
+                    <a:bodyPr/>
+                    <a:lstStyle/>
+                    <a:p>
+                      <a:r>
+                        <a:rPr lang="de-DE" b="1" dirty="0" smtClean="0"/>
+                        <a:t>0.001580</a:t>
+                      </a:r>
+                      <a:endParaRPr lang="de-DE" b="1" dirty="0"/>
+                    </a:p>
+                  </a:txBody>
+                  <a:tcPr/>
+                </a:tc>
+                <a:tc>
+                  <a:txBody>
+                    <a:bodyPr/>
+                    <a:lstStyle/>
+                    <a:p>
+                      <a:r>
+                        <a:rPr lang="de-DE" b="1" dirty="0" smtClean="0"/>
+                        <a:t>0.003373</a:t>
+                      </a:r>
+                      <a:endParaRPr lang="de-DE" b="1" dirty="0"/>
+                    </a:p>
+                  </a:txBody>
+                  <a:tcPr/>
+                </a:tc>
+              </a:tr>
+              <a:tr h="370840">
+                <a:tc>
+                  <a:txBody>
+                    <a:bodyPr/>
+                    <a:lstStyle/>
+                    <a:p>
+                      <a:r>
+                        <a:rPr lang="de-DE" dirty="0" err="1" smtClean="0"/>
+                        <a:t>avx</a:t>
+                      </a:r>
+                      <a:endParaRPr lang="de-DE" dirty="0"/>
+                    </a:p>
+                  </a:txBody>
+                  <a:tcPr/>
+                </a:tc>
+                <a:tc>
+                  <a:txBody>
+                    <a:bodyPr/>
+                    <a:lstStyle/>
+                    <a:p>
+                      <a:r>
+                        <a:rPr lang="de-DE" b="1" dirty="0" smtClean="0"/>
+                        <a:t>0.000142</a:t>
+                      </a:r>
+                      <a:endParaRPr lang="de-DE" b="1" dirty="0"/>
+                    </a:p>
+                  </a:txBody>
+                  <a:tcPr/>
+                </a:tc>
+                <a:tc>
+                  <a:txBody>
+                    <a:bodyPr/>
+                    <a:lstStyle/>
+                    <a:p>
+                      <a:r>
+                        <a:rPr lang="de-DE" b="1" dirty="0" smtClean="0"/>
+                        <a:t>0.001590</a:t>
+                      </a:r>
+                      <a:endParaRPr lang="de-DE" b="1" dirty="0"/>
+                    </a:p>
+                  </a:txBody>
+                  <a:tcPr/>
+                </a:tc>
+                <a:tc>
+                  <a:txBody>
+                    <a:bodyPr/>
+                    <a:lstStyle/>
+                    <a:p>
+                      <a:r>
+                        <a:rPr lang="de-DE" b="1" dirty="0" smtClean="0"/>
+                        <a:t>0.003293</a:t>
+                      </a:r>
+                      <a:endParaRPr lang="de-DE" b="1" dirty="0"/>
+                    </a:p>
+                  </a:txBody>
+                  <a:tcPr/>
+                </a:tc>
+              </a:tr>
+              <a:tr h="370840">
+                <a:tc>
+                  <a:txBody>
+                    <a:bodyPr/>
+                    <a:lstStyle/>
+                    <a:p>
+                      <a:r>
+                        <a:rPr lang="de-DE" dirty="0" err="1" smtClean="0"/>
+                        <a:t>speedup</a:t>
+                      </a:r>
+                      <a:endParaRPr lang="de-DE" dirty="0" smtClean="0"/>
+                    </a:p>
+                    <a:p>
+                      <a:r>
+                        <a:rPr lang="de-DE" dirty="0" smtClean="0"/>
+                        <a:t>(simple/</a:t>
+                      </a:r>
+                      <a:r>
+                        <a:rPr lang="de-DE" dirty="0" err="1" smtClean="0"/>
+                        <a:t>avx</a:t>
+                      </a:r>
+                      <a:r>
+                        <a:rPr lang="de-DE" dirty="0" smtClean="0"/>
+                        <a:t>)</a:t>
+                      </a:r>
+                      <a:endParaRPr lang="de-DE" dirty="0"/>
+                    </a:p>
+                  </a:txBody>
+                  <a:tcPr/>
+                </a:tc>
+                <a:tc>
+                  <a:txBody>
+                    <a:bodyPr/>
+                    <a:lstStyle/>
+                    <a:p>
+                      <a:r>
+                        <a:rPr lang="de-DE" dirty="0" smtClean="0"/>
+                        <a:t>~ 54x</a:t>
+                      </a:r>
+                      <a:endParaRPr lang="de-DE" dirty="0"/>
+                    </a:p>
+                  </a:txBody>
+                  <a:tcPr/>
+                </a:tc>
+                <a:tc>
+                  <a:txBody>
+                    <a:bodyPr/>
+                    <a:lstStyle/>
+                    <a:p>
+                      <a:r>
+                        <a:rPr lang="de-DE" dirty="0" smtClean="0"/>
+                        <a:t>~</a:t>
+                      </a:r>
+                      <a:r>
+                        <a:rPr lang="de-DE" baseline="0" dirty="0" smtClean="0"/>
+                        <a:t> </a:t>
+                      </a:r>
+                      <a:r>
+                        <a:rPr lang="de-DE" dirty="0" smtClean="0"/>
+                        <a:t>24x</a:t>
+                      </a:r>
+                      <a:endParaRPr lang="de-DE" dirty="0"/>
+                    </a:p>
+                  </a:txBody>
+                  <a:tcPr/>
+                </a:tc>
+                <a:tc>
+                  <a:txBody>
+                    <a:bodyPr/>
+                    <a:lstStyle/>
+                    <a:p>
+                      <a:r>
+                        <a:rPr lang="de-DE" dirty="0" smtClean="0"/>
+                        <a:t>~ 23x</a:t>
+                      </a:r>
+                      <a:endParaRPr lang="de-DE" dirty="0"/>
+                    </a:p>
+                  </a:txBody>
+                  <a:tcPr/>
+                </a:tc>
+              </a:tr>
+            </a:tbl>
+          </a:graphicData>
+        </a:graphic>
+      </p:graphicFrame>
+    </p:spTree>
+    <p:extLst>
+      <p:ext uri="{BB962C8B-B14F-4D97-AF65-F5344CB8AC3E}">
+        <p14:creationId xmlns:p14="http://schemas.microsoft.com/office/powerpoint/2010/main" val="1101494150"/>
       </p:ext>
     </p:extLst>
   </p:cSld>

</xml_diff>